<commit_message>
adding new slide links
</commit_message>
<xml_diff>
--- a/slides/GameBalancing.pptx
+++ b/slides/GameBalancing.pptx
@@ -4568,6 +4568,9 @@
               <a:t>How would you fix this problem? </a:t>
             </a:r>
           </a:p>
+          <a:p>
+            <a:endParaRPr lang="en-US" dirty="0"/>
+          </a:p>
         </p:txBody>
       </p:sp>
       <p:sp>
@@ -6152,7 +6155,15 @@
             <a:pPr lvl="1"/>
             <a:r>
               <a:rPr lang="en-US" dirty="0"/>
-              <a:t>When you scores, the other team gets the ball</a:t>
+              <a:t>When </a:t>
+            </a:r>
+            <a:r>
+              <a:rPr lang="en-US"/>
+              <a:t>you score, </a:t>
+            </a:r>
+            <a:r>
+              <a:rPr lang="en-US" dirty="0"/>
+              <a:t>the other team gets the ball</a:t>
             </a:r>
           </a:p>
           <a:p>
@@ -6744,13 +6755,14 @@
               <a:t>What does it mean for a game to be </a:t>
             </a:r>
             <a:r>
-              <a:rPr lang="en-US" b="1" i="1" u="sng" dirty="0"/>
+              <a:rPr lang="en-US" b="1" i="1" u="sng"/>
               <a:t>balanced</a:t>
             </a:r>
             <a:r>
-              <a:rPr lang="en-US" dirty="0"/>
+              <a:rPr lang="en-US"/>
               <a:t>?</a:t>
             </a:r>
+            <a:endParaRPr lang="en-US" dirty="0"/>
           </a:p>
         </p:txBody>
       </p:sp>

</xml_diff>